<commit_message>
Changes for ViewAllRisks and ViewSingleRisk screen.
</commit_message>
<xml_diff>
--- a/blob/ReactJSPoCUIPresentation.pptx
+++ b/blob/ReactJSPoCUIPresentation.pptx
@@ -317,7 +317,7 @@
             <a:fld id="{CC9A1170-701C-4C31-B563-99A077F1728F}" type="datetimeFigureOut">
               <a:rPr lang="en-US" smtClean="0"/>
               <a:pPr/>
-              <a:t>8/2/2019</a:t>
+              <a:t>11/7/2019</a:t>
             </a:fld>
             <a:endParaRPr lang="en-US"/>
           </a:p>
@@ -484,7 +484,7 @@
             <a:fld id="{CC9A1170-701C-4C31-B563-99A077F1728F}" type="datetimeFigureOut">
               <a:rPr lang="en-US" smtClean="0"/>
               <a:pPr/>
-              <a:t>8/2/2019</a:t>
+              <a:t>11/7/2019</a:t>
             </a:fld>
             <a:endParaRPr lang="en-US"/>
           </a:p>
@@ -661,7 +661,7 @@
             <a:fld id="{CC9A1170-701C-4C31-B563-99A077F1728F}" type="datetimeFigureOut">
               <a:rPr lang="en-US" smtClean="0"/>
               <a:pPr/>
-              <a:t>8/2/2019</a:t>
+              <a:t>11/7/2019</a:t>
             </a:fld>
             <a:endParaRPr lang="en-US"/>
           </a:p>
@@ -828,7 +828,7 @@
             <a:fld id="{CC9A1170-701C-4C31-B563-99A077F1728F}" type="datetimeFigureOut">
               <a:rPr lang="en-US" smtClean="0"/>
               <a:pPr/>
-              <a:t>8/2/2019</a:t>
+              <a:t>11/7/2019</a:t>
             </a:fld>
             <a:endParaRPr lang="en-US"/>
           </a:p>
@@ -1071,7 +1071,7 @@
             <a:fld id="{CC9A1170-701C-4C31-B563-99A077F1728F}" type="datetimeFigureOut">
               <a:rPr lang="en-US" smtClean="0"/>
               <a:pPr/>
-              <a:t>8/2/2019</a:t>
+              <a:t>11/7/2019</a:t>
             </a:fld>
             <a:endParaRPr lang="en-US"/>
           </a:p>
@@ -1356,7 +1356,7 @@
             <a:fld id="{CC9A1170-701C-4C31-B563-99A077F1728F}" type="datetimeFigureOut">
               <a:rPr lang="en-US" smtClean="0"/>
               <a:pPr/>
-              <a:t>8/2/2019</a:t>
+              <a:t>11/7/2019</a:t>
             </a:fld>
             <a:endParaRPr lang="en-US"/>
           </a:p>
@@ -1775,7 +1775,7 @@
             <a:fld id="{CC9A1170-701C-4C31-B563-99A077F1728F}" type="datetimeFigureOut">
               <a:rPr lang="en-US" smtClean="0"/>
               <a:pPr/>
-              <a:t>8/2/2019</a:t>
+              <a:t>11/7/2019</a:t>
             </a:fld>
             <a:endParaRPr lang="en-US"/>
           </a:p>
@@ -1890,7 +1890,7 @@
             <a:fld id="{CC9A1170-701C-4C31-B563-99A077F1728F}" type="datetimeFigureOut">
               <a:rPr lang="en-US" smtClean="0"/>
               <a:pPr/>
-              <a:t>8/2/2019</a:t>
+              <a:t>11/7/2019</a:t>
             </a:fld>
             <a:endParaRPr lang="en-US"/>
           </a:p>
@@ -1982,7 +1982,7 @@
             <a:fld id="{CC9A1170-701C-4C31-B563-99A077F1728F}" type="datetimeFigureOut">
               <a:rPr lang="en-US" smtClean="0"/>
               <a:pPr/>
-              <a:t>8/2/2019</a:t>
+              <a:t>11/7/2019</a:t>
             </a:fld>
             <a:endParaRPr lang="en-US"/>
           </a:p>
@@ -2256,7 +2256,7 @@
             <a:fld id="{CC9A1170-701C-4C31-B563-99A077F1728F}" type="datetimeFigureOut">
               <a:rPr lang="en-US" smtClean="0"/>
               <a:pPr/>
-              <a:t>8/2/2019</a:t>
+              <a:t>11/7/2019</a:t>
             </a:fld>
             <a:endParaRPr lang="en-US"/>
           </a:p>
@@ -2506,7 +2506,7 @@
             <a:fld id="{CC9A1170-701C-4C31-B563-99A077F1728F}" type="datetimeFigureOut">
               <a:rPr lang="en-US" smtClean="0"/>
               <a:pPr/>
-              <a:t>8/2/2019</a:t>
+              <a:t>11/7/2019</a:t>
             </a:fld>
             <a:endParaRPr lang="en-US"/>
           </a:p>
@@ -2716,7 +2716,7 @@
             <a:fld id="{CC9A1170-701C-4C31-B563-99A077F1728F}" type="datetimeFigureOut">
               <a:rPr lang="en-US" smtClean="0"/>
               <a:pPr/>
-              <a:t>8/2/2019</a:t>
+              <a:t>11/7/2019</a:t>
             </a:fld>
             <a:endParaRPr lang="en-US"/>
           </a:p>
@@ -4169,14 +4169,25 @@
               <a:rPr lang="en-US" dirty="0" smtClean="0">
                 <a:hlinkClick r:id="rId2"/>
               </a:rPr>
-              <a:t>https://reactjs-poc-ui-master.herokuapp.com/login</a:t>
-            </a:r>
-            <a:endParaRPr lang="en-US" dirty="0" smtClean="0"/>
-          </a:p>
-          <a:p>
-            <a:r>
-              <a:rPr lang="en-US" dirty="0" smtClean="0"/>
-              <a:t>Use above link to access UI.</a:t>
+              <a:t>https://</a:t>
+            </a:r>
+            <a:r>
+              <a:rPr lang="en-US" dirty="0" smtClean="0">
+                <a:hlinkClick r:id="rId2"/>
+              </a:rPr>
+              <a:t>apollo-reactjs-poc-ui-master.herokuapp.com</a:t>
+            </a:r>
+            <a:r>
+              <a:rPr lang="en-US" dirty="0" smtClean="0"/>
+              <a:t> </a:t>
+            </a:r>
+            <a:r>
+              <a:rPr lang="en-US" dirty="0" smtClean="0"/>
+              <a:t>Use </a:t>
+            </a:r>
+            <a:r>
+              <a:rPr lang="en-US" dirty="0" smtClean="0"/>
+              <a:t>above link to access UI.</a:t>
             </a:r>
           </a:p>
           <a:p>
@@ -4294,7 +4305,15 @@
           <a:p>
             <a:r>
               <a:rPr lang="en-US" dirty="0"/>
-              <a:t>Select appropriate Risk Instance from dropdown box.</a:t>
+              <a:t>Select appropriate Risk </a:t>
+            </a:r>
+            <a:r>
+              <a:rPr lang="en-US" dirty="0" smtClean="0"/>
+              <a:t>Name from Auto Complete dropdown </a:t>
+            </a:r>
+            <a:r>
+              <a:rPr lang="en-US" dirty="0"/>
+              <a:t>box.</a:t>
             </a:r>
           </a:p>
           <a:p>
@@ -4372,7 +4391,7 @@
       </p:sp>
       <p:pic>
         <p:nvPicPr>
-          <p:cNvPr id="6146" name="Picture 2"/>
+          <p:cNvPr id="1026" name="Picture 2"/>
           <p:cNvPicPr>
             <a:picLocks noChangeAspect="1" noChangeArrowheads="1"/>
           </p:cNvPicPr>
@@ -4387,8 +4406,8 @@
         </p:blipFill>
         <p:spPr bwMode="auto">
           <a:xfrm>
-            <a:off x="171450" y="1273175"/>
-            <a:ext cx="8667750" cy="4311650"/>
+            <a:off x="358775" y="1273175"/>
+            <a:ext cx="8426450" cy="4311650"/>
           </a:xfrm>
           <a:prstGeom prst="rect">
             <a:avLst/>
@@ -4486,9 +4505,32 @@
           </a:p>
           <a:p>
             <a:r>
-              <a:rPr lang="en-US" dirty="0"/>
-              <a:t>Screen will show all Risks and associated instance fields in tabular format.</a:t>
-            </a:r>
+              <a:rPr lang="en-US" dirty="0" smtClean="0"/>
+              <a:t>Screen will show </a:t>
+            </a:r>
+            <a:r>
+              <a:rPr lang="en-US" dirty="0" smtClean="0"/>
+              <a:t>one Page of </a:t>
+            </a:r>
+            <a:r>
+              <a:rPr lang="en-US" dirty="0" smtClean="0"/>
+              <a:t>Risk instances Risk </a:t>
+            </a:r>
+            <a:r>
+              <a:rPr lang="en-US" dirty="0" smtClean="0"/>
+              <a:t>Name and associated instance fields in tabular format for </a:t>
+            </a:r>
+            <a:r>
+              <a:rPr lang="en-US" dirty="0" smtClean="0"/>
+              <a:t>selected Risk Type.</a:t>
+            </a:r>
+          </a:p>
+          <a:p>
+            <a:r>
+              <a:rPr lang="en-US" dirty="0" smtClean="0"/>
+              <a:t>User can paginate forward and backward through Risk records.</a:t>
+            </a:r>
+            <a:endParaRPr lang="en-US" dirty="0" smtClean="0"/>
           </a:p>
           <a:p>
             <a:endParaRPr lang="en-US" dirty="0"/>
@@ -4552,7 +4594,7 @@
       </p:sp>
       <p:pic>
         <p:nvPicPr>
-          <p:cNvPr id="7170" name="Picture 2"/>
+          <p:cNvPr id="2050" name="Picture 2"/>
           <p:cNvPicPr>
             <a:picLocks noChangeAspect="1" noChangeArrowheads="1"/>
           </p:cNvPicPr>
@@ -4567,8 +4609,8 @@
         </p:blipFill>
         <p:spPr bwMode="auto">
           <a:xfrm>
-            <a:off x="244475" y="1504950"/>
-            <a:ext cx="8655050" cy="4286250"/>
+            <a:off x="358775" y="1377950"/>
+            <a:ext cx="8426450" cy="4337050"/>
           </a:xfrm>
           <a:prstGeom prst="rect">
             <a:avLst/>
@@ -4681,25 +4723,13 @@
           <a:p>
             <a:r>
               <a:rPr lang="en-US" dirty="0" smtClean="0"/>
-              <a:t>User : editor</a:t>
-            </a:r>
-            <a:r>
-              <a:rPr lang="en-US" dirty="0" smtClean="0"/>
-              <a:t> </a:t>
-            </a:r>
-            <a:r>
-              <a:rPr lang="en-US" dirty="0" smtClean="0"/>
-              <a:t>(lower case)</a:t>
-            </a:r>
-          </a:p>
-          <a:p>
-            <a:r>
-              <a:rPr lang="en-US" dirty="0" smtClean="0"/>
-              <a:t>Password : test#123 </a:t>
-            </a:r>
-            <a:r>
-              <a:rPr lang="en-US" dirty="0" smtClean="0"/>
-              <a:t>(lower case)</a:t>
+              <a:t>User : editor (lower case)</a:t>
+            </a:r>
+          </a:p>
+          <a:p>
+            <a:r>
+              <a:rPr lang="en-US" dirty="0" smtClean="0"/>
+              <a:t>Password : test#123 (lower case)</a:t>
             </a:r>
             <a:endParaRPr lang="en-US" dirty="0"/>
           </a:p>
@@ -4888,6 +4918,13 @@
   <p:clrMapOvr>
     <a:masterClrMapping/>
   </p:clrMapOvr>
+  <p:timing>
+    <p:tnLst>
+      <p:par>
+        <p:cTn id="1" dur="indefinite" restart="never" nodeType="tmRoot"/>
+      </p:par>
+    </p:tnLst>
+  </p:timing>
 </p:sld>
 </file>
 
@@ -4989,6 +5026,13 @@
   <p:clrMapOvr>
     <a:masterClrMapping/>
   </p:clrMapOvr>
+  <p:timing>
+    <p:tnLst>
+      <p:par>
+        <p:cTn id="1" dur="indefinite" restart="never" nodeType="tmRoot"/>
+      </p:par>
+    </p:tnLst>
+  </p:timing>
 </p:sld>
 </file>
 
@@ -5120,6 +5164,13 @@
   <p:clrMapOvr>
     <a:masterClrMapping/>
   </p:clrMapOvr>
+  <p:timing>
+    <p:tnLst>
+      <p:par>
+        <p:cTn id="1" dur="indefinite" restart="never" nodeType="tmRoot"/>
+      </p:par>
+    </p:tnLst>
+  </p:timing>
 </p:sld>
 </file>
 
@@ -5201,6 +5252,13 @@
   <p:clrMapOvr>
     <a:masterClrMapping/>
   </p:clrMapOvr>
+  <p:timing>
+    <p:tnLst>
+      <p:par>
+        <p:cTn id="1" dur="indefinite" restart="never" nodeType="tmRoot"/>
+      </p:par>
+    </p:tnLst>
+  </p:timing>
 </p:sld>
 </file>
 

</xml_diff>